<commit_message>
divide directory, add final GUIForm java class
</commit_message>
<xml_diff>
--- a/mapimgs/simimgs.pptx
+++ b/mapimgs/simimgs.pptx
@@ -7,7 +7,8 @@
   <p:sldIdLst>
     <p:sldId id="268" r:id="rId2"/>
     <p:sldId id="272" r:id="rId3"/>
-    <p:sldId id="267" r:id="rId4"/>
+    <p:sldId id="273" r:id="rId4"/>
+    <p:sldId id="267" r:id="rId5"/>
   </p:sldIdLst>
   <p:sldSz cx="12192000" cy="6858000"/>
   <p:notesSz cx="6858000" cy="9144000"/>
@@ -245,7 +246,7 @@
           <a:p>
             <a:fld id="{3DD05105-9068-4D52-A28C-348DFB89C4B7}" type="datetimeFigureOut">
               <a:rPr lang="ko-KR" altLang="en-US" smtClean="0"/>
-              <a:t>2019-12-01</a:t>
+              <a:t>2019-12-02</a:t>
             </a:fld>
             <a:endParaRPr lang="ko-KR" altLang="en-US"/>
           </a:p>
@@ -415,7 +416,7 @@
           <a:p>
             <a:fld id="{3DD05105-9068-4D52-A28C-348DFB89C4B7}" type="datetimeFigureOut">
               <a:rPr lang="ko-KR" altLang="en-US" smtClean="0"/>
-              <a:t>2019-12-01</a:t>
+              <a:t>2019-12-02</a:t>
             </a:fld>
             <a:endParaRPr lang="ko-KR" altLang="en-US"/>
           </a:p>
@@ -595,7 +596,7 @@
           <a:p>
             <a:fld id="{3DD05105-9068-4D52-A28C-348DFB89C4B7}" type="datetimeFigureOut">
               <a:rPr lang="ko-KR" altLang="en-US" smtClean="0"/>
-              <a:t>2019-12-01</a:t>
+              <a:t>2019-12-02</a:t>
             </a:fld>
             <a:endParaRPr lang="ko-KR" altLang="en-US"/>
           </a:p>
@@ -765,7 +766,7 @@
           <a:p>
             <a:fld id="{3DD05105-9068-4D52-A28C-348DFB89C4B7}" type="datetimeFigureOut">
               <a:rPr lang="ko-KR" altLang="en-US" smtClean="0"/>
-              <a:t>2019-12-01</a:t>
+              <a:t>2019-12-02</a:t>
             </a:fld>
             <a:endParaRPr lang="ko-KR" altLang="en-US"/>
           </a:p>
@@ -1011,7 +1012,7 @@
           <a:p>
             <a:fld id="{3DD05105-9068-4D52-A28C-348DFB89C4B7}" type="datetimeFigureOut">
               <a:rPr lang="ko-KR" altLang="en-US" smtClean="0"/>
-              <a:t>2019-12-01</a:t>
+              <a:t>2019-12-02</a:t>
             </a:fld>
             <a:endParaRPr lang="ko-KR" altLang="en-US"/>
           </a:p>
@@ -1243,7 +1244,7 @@
           <a:p>
             <a:fld id="{3DD05105-9068-4D52-A28C-348DFB89C4B7}" type="datetimeFigureOut">
               <a:rPr lang="ko-KR" altLang="en-US" smtClean="0"/>
-              <a:t>2019-12-01</a:t>
+              <a:t>2019-12-02</a:t>
             </a:fld>
             <a:endParaRPr lang="ko-KR" altLang="en-US"/>
           </a:p>
@@ -1610,7 +1611,7 @@
           <a:p>
             <a:fld id="{3DD05105-9068-4D52-A28C-348DFB89C4B7}" type="datetimeFigureOut">
               <a:rPr lang="ko-KR" altLang="en-US" smtClean="0"/>
-              <a:t>2019-12-01</a:t>
+              <a:t>2019-12-02</a:t>
             </a:fld>
             <a:endParaRPr lang="ko-KR" altLang="en-US"/>
           </a:p>
@@ -1728,7 +1729,7 @@
           <a:p>
             <a:fld id="{3DD05105-9068-4D52-A28C-348DFB89C4B7}" type="datetimeFigureOut">
               <a:rPr lang="ko-KR" altLang="en-US" smtClean="0"/>
-              <a:t>2019-12-01</a:t>
+              <a:t>2019-12-02</a:t>
             </a:fld>
             <a:endParaRPr lang="ko-KR" altLang="en-US"/>
           </a:p>
@@ -1823,7 +1824,7 @@
           <a:p>
             <a:fld id="{3DD05105-9068-4D52-A28C-348DFB89C4B7}" type="datetimeFigureOut">
               <a:rPr lang="ko-KR" altLang="en-US" smtClean="0"/>
-              <a:t>2019-12-01</a:t>
+              <a:t>2019-12-02</a:t>
             </a:fld>
             <a:endParaRPr lang="ko-KR" altLang="en-US"/>
           </a:p>
@@ -2100,7 +2101,7 @@
           <a:p>
             <a:fld id="{3DD05105-9068-4D52-A28C-348DFB89C4B7}" type="datetimeFigureOut">
               <a:rPr lang="ko-KR" altLang="en-US" smtClean="0"/>
-              <a:t>2019-12-01</a:t>
+              <a:t>2019-12-02</a:t>
             </a:fld>
             <a:endParaRPr lang="ko-KR" altLang="en-US"/>
           </a:p>
@@ -2353,7 +2354,7 @@
           <a:p>
             <a:fld id="{3DD05105-9068-4D52-A28C-348DFB89C4B7}" type="datetimeFigureOut">
               <a:rPr lang="ko-KR" altLang="en-US" smtClean="0"/>
-              <a:t>2019-12-01</a:t>
+              <a:t>2019-12-02</a:t>
             </a:fld>
             <a:endParaRPr lang="ko-KR" altLang="en-US"/>
           </a:p>
@@ -2566,7 +2567,7 @@
           <a:p>
             <a:fld id="{3DD05105-9068-4D52-A28C-348DFB89C4B7}" type="datetimeFigureOut">
               <a:rPr lang="ko-KR" altLang="en-US" smtClean="0"/>
-              <a:t>2019-12-01</a:t>
+              <a:t>2019-12-02</a:t>
             </a:fld>
             <a:endParaRPr lang="ko-KR" altLang="en-US"/>
           </a:p>
@@ -3096,228 +3097,6 @@
           </a:p>
         </p:txBody>
       </p:sp>
-      <p:pic>
-        <p:nvPicPr>
-          <p:cNvPr id="14" name="그림 13"/>
-          <p:cNvPicPr>
-            <a:picLocks noChangeAspect="1"/>
-          </p:cNvPicPr>
-          <p:nvPr/>
-        </p:nvPicPr>
-        <p:blipFill rotWithShape="1">
-          <a:blip r:embed="rId2">
-            <a:extLst>
-              <a:ext uri="{28A0092B-C50C-407E-A947-70E740481C1C}">
-                <a14:useLocalDpi xmlns:a14="http://schemas.microsoft.com/office/drawing/2010/main" val="0"/>
-              </a:ext>
-            </a:extLst>
-          </a:blip>
-          <a:srcRect l="1965" t="3035" r="81875" b="75417"/>
-          <a:stretch/>
-        </p:blipFill>
-        <p:spPr>
-          <a:xfrm>
-            <a:off x="2191656" y="566056"/>
-            <a:ext cx="1080000" cy="1080000"/>
-          </a:xfrm>
-          <a:prstGeom prst="rect">
-            <a:avLst/>
-          </a:prstGeom>
-        </p:spPr>
-      </p:pic>
-      <p:pic>
-        <p:nvPicPr>
-          <p:cNvPr id="15" name="그림 14"/>
-          <p:cNvPicPr>
-            <a:picLocks/>
-          </p:cNvPicPr>
-          <p:nvPr/>
-        </p:nvPicPr>
-        <p:blipFill rotWithShape="1">
-          <a:blip r:embed="rId2">
-            <a:extLst>
-              <a:ext uri="{28A0092B-C50C-407E-A947-70E740481C1C}">
-                <a14:useLocalDpi xmlns:a14="http://schemas.microsoft.com/office/drawing/2010/main" val="0"/>
-              </a:ext>
-            </a:extLst>
-          </a:blip>
-          <a:srcRect l="4348" t="51104" r="84024" b="27770"/>
-          <a:stretch/>
-        </p:blipFill>
-        <p:spPr>
-          <a:xfrm>
-            <a:off x="4345731" y="624112"/>
-            <a:ext cx="1080000" cy="1080000"/>
-          </a:xfrm>
-          <a:prstGeom prst="rect">
-            <a:avLst/>
-          </a:prstGeom>
-        </p:spPr>
-      </p:pic>
-      <p:pic>
-        <p:nvPicPr>
-          <p:cNvPr id="16" name="그림 15"/>
-          <p:cNvPicPr>
-            <a:picLocks/>
-          </p:cNvPicPr>
-          <p:nvPr/>
-        </p:nvPicPr>
-        <p:blipFill rotWithShape="1">
-          <a:blip r:embed="rId3">
-            <a:extLst>
-              <a:ext uri="{BEBA8EAE-BF5A-486C-A8C5-ECC9F3942E4B}">
-                <a14:imgProps xmlns:a14="http://schemas.microsoft.com/office/drawing/2010/main">
-                  <a14:imgLayer r:embed="rId4">
-                    <a14:imgEffect>
-                      <a14:saturation sat="0"/>
-                    </a14:imgEffect>
-                  </a14:imgLayer>
-                </a14:imgProps>
-              </a:ext>
-              <a:ext uri="{28A0092B-C50C-407E-A947-70E740481C1C}">
-                <a14:useLocalDpi xmlns:a14="http://schemas.microsoft.com/office/drawing/2010/main" val="0"/>
-              </a:ext>
-            </a:extLst>
-          </a:blip>
-          <a:srcRect l="34107" t="75654" r="49911" b="3989"/>
-          <a:stretch/>
-        </p:blipFill>
-        <p:spPr>
-          <a:xfrm>
-            <a:off x="6807201" y="442686"/>
-            <a:ext cx="1080000" cy="1080000"/>
-          </a:xfrm>
-          <a:prstGeom prst="rect">
-            <a:avLst/>
-          </a:prstGeom>
-          <a:noFill/>
-        </p:spPr>
-      </p:pic>
-      <p:pic>
-        <p:nvPicPr>
-          <p:cNvPr id="17" name="그림 16"/>
-          <p:cNvPicPr>
-            <a:picLocks/>
-          </p:cNvPicPr>
-          <p:nvPr/>
-        </p:nvPicPr>
-        <p:blipFill rotWithShape="1">
-          <a:blip r:embed="rId2">
-            <a:extLst>
-              <a:ext uri="{28A0092B-C50C-407E-A947-70E740481C1C}">
-                <a14:useLocalDpi xmlns:a14="http://schemas.microsoft.com/office/drawing/2010/main" val="0"/>
-              </a:ext>
-            </a:extLst>
-          </a:blip>
-          <a:srcRect l="34107" t="75654" r="49911" b="3989"/>
-          <a:stretch/>
-        </p:blipFill>
-        <p:spPr>
-          <a:xfrm>
-            <a:off x="8773520" y="442686"/>
-            <a:ext cx="1080000" cy="1080000"/>
-          </a:xfrm>
-          <a:prstGeom prst="rect">
-            <a:avLst/>
-          </a:prstGeom>
-        </p:spPr>
-      </p:pic>
-      <p:pic>
-        <p:nvPicPr>
-          <p:cNvPr id="18" name="그림 17"/>
-          <p:cNvPicPr>
-            <a:picLocks/>
-          </p:cNvPicPr>
-          <p:nvPr/>
-        </p:nvPicPr>
-        <p:blipFill rotWithShape="1">
-          <a:blip r:embed="rId2">
-            <a:extLst>
-              <a:ext uri="{28A0092B-C50C-407E-A947-70E740481C1C}">
-                <a14:useLocalDpi xmlns:a14="http://schemas.microsoft.com/office/drawing/2010/main" val="0"/>
-              </a:ext>
-            </a:extLst>
-          </a:blip>
-          <a:srcRect l="82143" t="2560" r="2589" b="74940"/>
-          <a:stretch/>
-        </p:blipFill>
-        <p:spPr>
-          <a:xfrm>
-            <a:off x="6807201" y="2046516"/>
-            <a:ext cx="1080000" cy="1080000"/>
-          </a:xfrm>
-          <a:prstGeom prst="rect">
-            <a:avLst/>
-          </a:prstGeom>
-        </p:spPr>
-      </p:pic>
-      <p:pic>
-        <p:nvPicPr>
-          <p:cNvPr id="20" name="그림 19"/>
-          <p:cNvPicPr>
-            <a:picLocks noChangeAspect="1"/>
-          </p:cNvPicPr>
-          <p:nvPr/>
-        </p:nvPicPr>
-        <p:blipFill rotWithShape="1">
-          <a:blip r:embed="rId2">
-            <a:extLst>
-              <a:ext uri="{28A0092B-C50C-407E-A947-70E740481C1C}">
-                <a14:useLocalDpi xmlns:a14="http://schemas.microsoft.com/office/drawing/2010/main" val="0"/>
-              </a:ext>
-            </a:extLst>
-          </a:blip>
-          <a:srcRect l="50982" t="27083" r="34911" b="51488"/>
-          <a:stretch/>
-        </p:blipFill>
-        <p:spPr>
-          <a:xfrm>
-            <a:off x="4279102" y="2473373"/>
-            <a:ext cx="1146629" cy="1306286"/>
-          </a:xfrm>
-          <a:prstGeom prst="rect">
-            <a:avLst/>
-          </a:prstGeom>
-        </p:spPr>
-      </p:pic>
-      <p:pic>
-        <p:nvPicPr>
-          <p:cNvPr id="21" name="그림 20"/>
-          <p:cNvPicPr>
-            <a:picLocks noChangeAspect="1"/>
-          </p:cNvPicPr>
-          <p:nvPr/>
-        </p:nvPicPr>
-        <p:blipFill rotWithShape="1">
-          <a:blip r:embed="rId3">
-            <a:extLst>
-              <a:ext uri="{BEBA8EAE-BF5A-486C-A8C5-ECC9F3942E4B}">
-                <a14:imgProps xmlns:a14="http://schemas.microsoft.com/office/drawing/2010/main">
-                  <a14:imgLayer r:embed="rId4">
-                    <a14:imgEffect>
-                      <a14:saturation sat="0"/>
-                    </a14:imgEffect>
-                  </a14:imgLayer>
-                </a14:imgProps>
-              </a:ext>
-              <a:ext uri="{28A0092B-C50C-407E-A947-70E740481C1C}">
-                <a14:useLocalDpi xmlns:a14="http://schemas.microsoft.com/office/drawing/2010/main" val="0"/>
-              </a:ext>
-            </a:extLst>
-          </a:blip>
-          <a:srcRect l="50982" t="27083" r="34911" b="51488"/>
-          <a:stretch/>
-        </p:blipFill>
-        <p:spPr>
-          <a:xfrm>
-            <a:off x="2191656" y="2473373"/>
-            <a:ext cx="1146629" cy="1306286"/>
-          </a:xfrm>
-          <a:prstGeom prst="rect">
-            <a:avLst/>
-          </a:prstGeom>
-        </p:spPr>
-      </p:pic>
     </p:spTree>
     <p:extLst>
       <p:ext uri="{BB962C8B-B14F-4D97-AF65-F5344CB8AC3E}">
@@ -3388,7 +3167,7 @@
       </p:pic>
       <p:pic>
         <p:nvPicPr>
-          <p:cNvPr id="3" name="그림 2"/>
+          <p:cNvPr id="4" name="그림 3"/>
           <p:cNvPicPr>
             <a:picLocks/>
           </p:cNvPicPr>
@@ -3396,48 +3175,6 @@
         </p:nvPicPr>
         <p:blipFill rotWithShape="1">
           <a:blip r:embed="rId4">
-            <a:extLst>
-              <a:ext uri="{BEBA8EAE-BF5A-486C-A8C5-ECC9F3942E4B}">
-                <a14:imgProps xmlns:a14="http://schemas.microsoft.com/office/drawing/2010/main">
-                  <a14:imgLayer r:embed="rId3">
-                    <a14:imgEffect>
-                      <a14:backgroundRemoval t="51042" b="71875" l="4375" r="15937">
-                        <a14:foregroundMark x1="8750" y1="53333" x2="8750" y2="52292"/>
-                        <a14:foregroundMark x1="8438" y1="54167" x2="9063" y2="51458"/>
-                        <a14:foregroundMark x1="7344" y1="63125" x2="5625" y2="65000"/>
-                      </a14:backgroundRemoval>
-                    </a14:imgEffect>
-                  </a14:imgLayer>
-                </a14:imgProps>
-              </a:ext>
-              <a:ext uri="{28A0092B-C50C-407E-A947-70E740481C1C}">
-                <a14:useLocalDpi xmlns:a14="http://schemas.microsoft.com/office/drawing/2010/main" val="0"/>
-              </a:ext>
-            </a:extLst>
-          </a:blip>
-          <a:srcRect l="4348" t="51104" r="84024" b="27770"/>
-          <a:stretch/>
-        </p:blipFill>
-        <p:spPr>
-          <a:xfrm>
-            <a:off x="4345731" y="624112"/>
-            <a:ext cx="1080000" cy="1080000"/>
-          </a:xfrm>
-          <a:prstGeom prst="rect">
-            <a:avLst/>
-          </a:prstGeom>
-        </p:spPr>
-      </p:pic>
-      <p:pic>
-        <p:nvPicPr>
-          <p:cNvPr id="4" name="그림 3"/>
-          <p:cNvPicPr>
-            <a:picLocks/>
-          </p:cNvPicPr>
-          <p:nvPr/>
-        </p:nvPicPr>
-        <p:blipFill rotWithShape="1">
-          <a:blip r:embed="rId5">
             <a:extLst>
               <a:ext uri="{BEBA8EAE-BF5A-486C-A8C5-ECC9F3942E4B}">
                 <a14:imgProps xmlns:a14="http://schemas.microsoft.com/office/drawing/2010/main">
@@ -3482,7 +3219,7 @@
           <p:nvPr/>
         </p:nvPicPr>
         <p:blipFill rotWithShape="1">
-          <a:blip r:embed="rId6">
+          <a:blip r:embed="rId5">
             <a:extLst>
               <a:ext uri="{BEBA8EAE-BF5A-486C-A8C5-ECC9F3942E4B}">
                 <a14:imgProps xmlns:a14="http://schemas.microsoft.com/office/drawing/2010/main">
@@ -3522,7 +3259,7 @@
           <p:nvPr/>
         </p:nvPicPr>
         <p:blipFill rotWithShape="1">
-          <a:blip r:embed="rId7">
+          <a:blip r:embed="rId6">
             <a:extLst>
               <a:ext uri="{BEBA8EAE-BF5A-486C-A8C5-ECC9F3942E4B}">
                 <a14:imgProps xmlns:a14="http://schemas.microsoft.com/office/drawing/2010/main">
@@ -3545,7 +3282,7 @@
         </p:blipFill>
         <p:spPr>
           <a:xfrm>
-            <a:off x="6807201" y="2046516"/>
+            <a:off x="4279102" y="566056"/>
             <a:ext cx="1080000" cy="1080000"/>
           </a:xfrm>
           <a:prstGeom prst="rect">
@@ -3562,7 +3299,7 @@
           <p:nvPr/>
         </p:nvPicPr>
         <p:blipFill rotWithShape="1">
-          <a:blip r:embed="rId8">
+          <a:blip r:embed="rId7">
             <a:extLst>
               <a:ext uri="{BEBA8EAE-BF5A-486C-A8C5-ECC9F3942E4B}">
                 <a14:imgProps xmlns:a14="http://schemas.microsoft.com/office/drawing/2010/main">
@@ -3602,7 +3339,7 @@
           <p:nvPr/>
         </p:nvPicPr>
         <p:blipFill rotWithShape="1">
-          <a:blip r:embed="rId9">
+          <a:blip r:embed="rId8">
             <a:extLst>
               <a:ext uri="{BEBA8EAE-BF5A-486C-A8C5-ECC9F3942E4B}">
                 <a14:imgProps xmlns:a14="http://schemas.microsoft.com/office/drawing/2010/main">
@@ -3678,6 +3415,194 @@
           </a:p>
         </p:txBody>
       </p:sp>
+      <p:pic>
+        <p:nvPicPr>
+          <p:cNvPr id="18" name="그림 17"/>
+          <p:cNvPicPr>
+            <a:picLocks/>
+          </p:cNvPicPr>
+          <p:nvPr/>
+        </p:nvPicPr>
+        <p:blipFill rotWithShape="1">
+          <a:blip r:embed="rId9">
+            <a:extLst>
+              <a:ext uri="{BEBA8EAE-BF5A-486C-A8C5-ECC9F3942E4B}">
+                <a14:imgProps xmlns:a14="http://schemas.microsoft.com/office/drawing/2010/main">
+                  <a14:imgLayer r:embed="rId3">
+                    <a14:imgEffect>
+                      <a14:backgroundRemoval t="51042" b="73125" l="34375" r="50469">
+                        <a14:foregroundMark x1="38125" y1="54792" x2="39375" y2="55208"/>
+                        <a14:foregroundMark x1="44063" y1="52083" x2="45156" y2="53542"/>
+                        <a14:foregroundMark x1="42344" y1="61042" x2="41406" y2="62292"/>
+                        <a14:foregroundMark x1="37031" y1="64375" x2="35938" y2="66042"/>
+                        <a14:foregroundMark x1="39531" y1="54792" x2="38750" y2="54583"/>
+                        <a14:foregroundMark x1="39375" y1="55833" x2="39375" y2="56458"/>
+                        <a14:foregroundMark x1="45000" y1="52917" x2="45000" y2="52500"/>
+                        <a14:backgroundMark x1="43281" y1="61250" x2="42969" y2="62292"/>
+                      </a14:backgroundRemoval>
+                    </a14:imgEffect>
+                  </a14:imgLayer>
+                </a14:imgProps>
+              </a:ext>
+              <a:ext uri="{28A0092B-C50C-407E-A947-70E740481C1C}">
+                <a14:useLocalDpi xmlns:a14="http://schemas.microsoft.com/office/drawing/2010/main" val="0"/>
+              </a:ext>
+            </a:extLst>
+          </a:blip>
+          <a:srcRect l="34644" t="51131" r="50535" b="27560"/>
+          <a:stretch/>
+        </p:blipFill>
+        <p:spPr>
+          <a:xfrm>
+            <a:off x="6574972" y="2473373"/>
+            <a:ext cx="1080000" cy="1080000"/>
+          </a:xfrm>
+          <a:prstGeom prst="rect">
+            <a:avLst/>
+          </a:prstGeom>
+        </p:spPr>
+      </p:pic>
+      <p:pic>
+        <p:nvPicPr>
+          <p:cNvPr id="19" name="그림 18"/>
+          <p:cNvPicPr>
+            <a:picLocks/>
+          </p:cNvPicPr>
+          <p:nvPr/>
+        </p:nvPicPr>
+        <p:blipFill rotWithShape="1">
+          <a:blip r:embed="rId9">
+            <a:extLst>
+              <a:ext uri="{BEBA8EAE-BF5A-486C-A8C5-ECC9F3942E4B}">
+                <a14:imgProps xmlns:a14="http://schemas.microsoft.com/office/drawing/2010/main">
+                  <a14:imgLayer r:embed="rId3">
+                    <a14:imgEffect>
+                      <a14:backgroundRemoval t="51042" b="73125" l="34375" r="50469">
+                        <a14:foregroundMark x1="38125" y1="54792" x2="39375" y2="55208"/>
+                        <a14:foregroundMark x1="44063" y1="52083" x2="45156" y2="53542"/>
+                        <a14:foregroundMark x1="42344" y1="61042" x2="41406" y2="62292"/>
+                        <a14:foregroundMark x1="37031" y1="64375" x2="35938" y2="66042"/>
+                        <a14:foregroundMark x1="39531" y1="54792" x2="38750" y2="54583"/>
+                        <a14:foregroundMark x1="39375" y1="55833" x2="39375" y2="56458"/>
+                        <a14:foregroundMark x1="45000" y1="52917" x2="45000" y2="52500"/>
+                        <a14:backgroundMark x1="43281" y1="61250" x2="42969" y2="62292"/>
+                      </a14:backgroundRemoval>
+                    </a14:imgEffect>
+                  </a14:imgLayer>
+                </a14:imgProps>
+              </a:ext>
+              <a:ext uri="{28A0092B-C50C-407E-A947-70E740481C1C}">
+                <a14:useLocalDpi xmlns:a14="http://schemas.microsoft.com/office/drawing/2010/main" val="0"/>
+              </a:ext>
+            </a:extLst>
+          </a:blip>
+          <a:srcRect l="34644" t="51131" r="50535" b="27560"/>
+          <a:stretch/>
+        </p:blipFill>
+        <p:spPr>
+          <a:xfrm flipH="1">
+            <a:off x="9013372" y="2473373"/>
+            <a:ext cx="1080000" cy="1080000"/>
+          </a:xfrm>
+          <a:prstGeom prst="rect">
+            <a:avLst/>
+          </a:prstGeom>
+        </p:spPr>
+      </p:pic>
+      <p:pic>
+        <p:nvPicPr>
+          <p:cNvPr id="20" name="그림 19"/>
+          <p:cNvPicPr>
+            <a:picLocks/>
+          </p:cNvPicPr>
+          <p:nvPr/>
+        </p:nvPicPr>
+        <p:blipFill rotWithShape="1">
+          <a:blip r:embed="rId9">
+            <a:extLst>
+              <a:ext uri="{BEBA8EAE-BF5A-486C-A8C5-ECC9F3942E4B}">
+                <a14:imgProps xmlns:a14="http://schemas.microsoft.com/office/drawing/2010/main">
+                  <a14:imgLayer r:embed="rId3">
+                    <a14:imgEffect>
+                      <a14:backgroundRemoval t="51042" b="73125" l="34375" r="50469">
+                        <a14:foregroundMark x1="38125" y1="54792" x2="39375" y2="55208"/>
+                        <a14:foregroundMark x1="44063" y1="52083" x2="45156" y2="53542"/>
+                        <a14:foregroundMark x1="42344" y1="61042" x2="41406" y2="62292"/>
+                        <a14:foregroundMark x1="37031" y1="64375" x2="35938" y2="66042"/>
+                        <a14:foregroundMark x1="39531" y1="54792" x2="38750" y2="54583"/>
+                        <a14:foregroundMark x1="39375" y1="55833" x2="39375" y2="56458"/>
+                        <a14:foregroundMark x1="45000" y1="52917" x2="45000" y2="52500"/>
+                        <a14:backgroundMark x1="43281" y1="61250" x2="42969" y2="62292"/>
+                      </a14:backgroundRemoval>
+                    </a14:imgEffect>
+                  </a14:imgLayer>
+                </a14:imgProps>
+              </a:ext>
+              <a:ext uri="{28A0092B-C50C-407E-A947-70E740481C1C}">
+                <a14:useLocalDpi xmlns:a14="http://schemas.microsoft.com/office/drawing/2010/main" val="0"/>
+              </a:ext>
+            </a:extLst>
+          </a:blip>
+          <a:srcRect l="34644" t="51131" r="50535" b="27560"/>
+          <a:stretch/>
+        </p:blipFill>
+        <p:spPr>
+          <a:xfrm rot="16200000">
+            <a:off x="6524172" y="4086303"/>
+            <a:ext cx="1080000" cy="1080000"/>
+          </a:xfrm>
+          <a:prstGeom prst="rect">
+            <a:avLst/>
+          </a:prstGeom>
+        </p:spPr>
+      </p:pic>
+      <p:pic>
+        <p:nvPicPr>
+          <p:cNvPr id="21" name="그림 20"/>
+          <p:cNvPicPr>
+            <a:picLocks/>
+          </p:cNvPicPr>
+          <p:nvPr/>
+        </p:nvPicPr>
+        <p:blipFill rotWithShape="1">
+          <a:blip r:embed="rId9">
+            <a:extLst>
+              <a:ext uri="{BEBA8EAE-BF5A-486C-A8C5-ECC9F3942E4B}">
+                <a14:imgProps xmlns:a14="http://schemas.microsoft.com/office/drawing/2010/main">
+                  <a14:imgLayer r:embed="rId3">
+                    <a14:imgEffect>
+                      <a14:backgroundRemoval t="51042" b="73125" l="34375" r="50469">
+                        <a14:foregroundMark x1="38125" y1="54792" x2="39375" y2="55208"/>
+                        <a14:foregroundMark x1="44063" y1="52083" x2="45156" y2="53542"/>
+                        <a14:foregroundMark x1="42344" y1="61042" x2="41406" y2="62292"/>
+                        <a14:foregroundMark x1="37031" y1="64375" x2="35938" y2="66042"/>
+                        <a14:foregroundMark x1="39531" y1="54792" x2="38750" y2="54583"/>
+                        <a14:foregroundMark x1="39375" y1="55833" x2="39375" y2="56458"/>
+                        <a14:foregroundMark x1="45000" y1="52917" x2="45000" y2="52500"/>
+                        <a14:backgroundMark x1="43281" y1="61250" x2="42969" y2="62292"/>
+                      </a14:backgroundRemoval>
+                    </a14:imgEffect>
+                  </a14:imgLayer>
+                </a14:imgProps>
+              </a:ext>
+              <a:ext uri="{28A0092B-C50C-407E-A947-70E740481C1C}">
+                <a14:useLocalDpi xmlns:a14="http://schemas.microsoft.com/office/drawing/2010/main" val="0"/>
+              </a:ext>
+            </a:extLst>
+          </a:blip>
+          <a:srcRect l="34644" t="51131" r="50535" b="27560"/>
+          <a:stretch/>
+        </p:blipFill>
+        <p:spPr>
+          <a:xfrm rot="5400000">
+            <a:off x="9013372" y="4086303"/>
+            <a:ext cx="1080000" cy="1080000"/>
+          </a:xfrm>
+          <a:prstGeom prst="rect">
+            <a:avLst/>
+          </a:prstGeom>
+        </p:spPr>
+      </p:pic>
     </p:spTree>
     <p:extLst>
       <p:ext uri="{BB962C8B-B14F-4D97-AF65-F5344CB8AC3E}">
@@ -3708,145 +3633,222 @@
           <a:chExt cx="0" cy="0"/>
         </a:xfrm>
       </p:grpSpPr>
-      <p:sp>
-        <p:nvSpPr>
-          <p:cNvPr id="4" name="TextBox 3"/>
-          <p:cNvSpPr txBox="1"/>
+      <p:pic>
+        <p:nvPicPr>
+          <p:cNvPr id="5" name="그림 4"/>
+          <p:cNvPicPr>
+            <a:picLocks/>
+          </p:cNvPicPr>
           <p:nvPr/>
-        </p:nvSpPr>
+        </p:nvPicPr>
+        <p:blipFill rotWithShape="1">
+          <a:blip r:embed="rId2">
+            <a:extLst>
+              <a:ext uri="{BEBA8EAE-BF5A-486C-A8C5-ECC9F3942E4B}">
+                <a14:imgProps xmlns:a14="http://schemas.microsoft.com/office/drawing/2010/main">
+                  <a14:imgLayer r:embed="rId3">
+                    <a14:imgEffect>
+                      <a14:backgroundRemoval t="51042" b="73125" l="34375" r="50469">
+                        <a14:foregroundMark x1="38125" y1="54792" x2="39375" y2="55208"/>
+                        <a14:foregroundMark x1="44063" y1="52083" x2="45156" y2="53542"/>
+                        <a14:foregroundMark x1="42344" y1="61042" x2="41406" y2="62292"/>
+                        <a14:foregroundMark x1="37031" y1="64375" x2="35938" y2="66042"/>
+                        <a14:foregroundMark x1="39531" y1="54792" x2="38750" y2="54583"/>
+                        <a14:foregroundMark x1="39375" y1="55833" x2="39375" y2="56458"/>
+                        <a14:foregroundMark x1="45000" y1="52917" x2="45000" y2="52500"/>
+                        <a14:backgroundMark x1="43281" y1="61250" x2="42969" y2="62292"/>
+                      </a14:backgroundRemoval>
+                    </a14:imgEffect>
+                  </a14:imgLayer>
+                </a14:imgProps>
+              </a:ext>
+              <a:ext uri="{28A0092B-C50C-407E-A947-70E740481C1C}">
+                <a14:useLocalDpi xmlns:a14="http://schemas.microsoft.com/office/drawing/2010/main" val="0"/>
+              </a:ext>
+            </a:extLst>
+          </a:blip>
+          <a:srcRect l="34644" t="51131" r="50535" b="27560"/>
+          <a:stretch/>
+        </p:blipFill>
         <p:spPr>
           <a:xfrm>
-            <a:off x="4427621" y="1684421"/>
-            <a:ext cx="1778051" cy="738664"/>
+            <a:off x="1553029" y="551541"/>
+            <a:ext cx="1080000" cy="1080000"/>
           </a:xfrm>
           <a:prstGeom prst="rect">
             <a:avLst/>
           </a:prstGeom>
-          <a:noFill/>
         </p:spPr>
-        <p:txBody>
-          <a:bodyPr wrap="none" rtlCol="0">
-            <a:spAutoFit/>
-          </a:bodyPr>
-          <a:lstStyle/>
-          <a:p>
-            <a:r>
-              <a:rPr lang="ko-KR" altLang="en-US" sz="1400" dirty="0" smtClean="0">
-                <a:latin typeface="나눔스퀘어 ExtraBold" panose="020B0600000101010101" pitchFamily="50" charset="-127"/>
-                <a:ea typeface="나눔스퀘어 ExtraBold" panose="020B0600000101010101" pitchFamily="50" charset="-127"/>
-              </a:rPr>
-              <a:t>컴퓨터과학부</a:t>
-            </a:r>
-            <a:endParaRPr lang="en-US" altLang="ko-KR" sz="1400" dirty="0" smtClean="0">
-              <a:latin typeface="나눔스퀘어 ExtraBold" panose="020B0600000101010101" pitchFamily="50" charset="-127"/>
-              <a:ea typeface="나눔스퀘어 ExtraBold" panose="020B0600000101010101" pitchFamily="50" charset="-127"/>
-            </a:endParaRPr>
-          </a:p>
-          <a:p>
-            <a:r>
-              <a:rPr lang="en-US" altLang="ko-KR" sz="1400" dirty="0" smtClean="0">
-                <a:latin typeface="나눔스퀘어 Light" panose="020B0600000101010101" pitchFamily="50" charset="-127"/>
-                <a:ea typeface="나눔스퀘어 Light" panose="020B0600000101010101" pitchFamily="50" charset="-127"/>
-              </a:rPr>
-              <a:t>2015920016 </a:t>
-            </a:r>
-            <a:r>
-              <a:rPr lang="ko-KR" altLang="en-US" sz="1400" dirty="0" err="1" smtClean="0">
-                <a:latin typeface="나눔스퀘어 Light" panose="020B0600000101010101" pitchFamily="50" charset="-127"/>
-                <a:ea typeface="나눔스퀘어 Light" panose="020B0600000101010101" pitchFamily="50" charset="-127"/>
-              </a:rPr>
-              <a:t>도우찬</a:t>
-            </a:r>
-            <a:endParaRPr lang="en-US" altLang="ko-KR" sz="1400" dirty="0" smtClean="0">
-              <a:latin typeface="나눔스퀘어 Light" panose="020B0600000101010101" pitchFamily="50" charset="-127"/>
-              <a:ea typeface="나눔스퀘어 Light" panose="020B0600000101010101" pitchFamily="50" charset="-127"/>
-            </a:endParaRPr>
-          </a:p>
-          <a:p>
-            <a:r>
-              <a:rPr lang="en-US" altLang="ko-KR" sz="1400" dirty="0" smtClean="0">
-                <a:latin typeface="나눔스퀘어 Light" panose="020B0600000101010101" pitchFamily="50" charset="-127"/>
-                <a:ea typeface="나눔스퀘어 Light" panose="020B0600000101010101" pitchFamily="50" charset="-127"/>
-              </a:rPr>
-              <a:t>2015920057 </a:t>
-            </a:r>
-            <a:r>
-              <a:rPr lang="ko-KR" altLang="en-US" sz="1400" dirty="0" err="1" smtClean="0">
-                <a:latin typeface="나눔스퀘어 Light" panose="020B0600000101010101" pitchFamily="50" charset="-127"/>
-                <a:ea typeface="나눔스퀘어 Light" panose="020B0600000101010101" pitchFamily="50" charset="-127"/>
-              </a:rPr>
-              <a:t>하경민</a:t>
-            </a:r>
-            <a:endParaRPr lang="ko-KR" altLang="en-US" sz="1400" dirty="0">
-              <a:latin typeface="나눔스퀘어 Light" panose="020B0600000101010101" pitchFamily="50" charset="-127"/>
-              <a:ea typeface="나눔스퀘어 Light" panose="020B0600000101010101" pitchFamily="50" charset="-127"/>
-            </a:endParaRPr>
-          </a:p>
-        </p:txBody>
-      </p:sp>
+      </p:pic>
+    </p:spTree>
+    <p:extLst>
+      <p:ext uri="{BB962C8B-B14F-4D97-AF65-F5344CB8AC3E}">
+        <p14:creationId xmlns:p14="http://schemas.microsoft.com/office/powerpoint/2010/main" val="120233384"/>
+      </p:ext>
+    </p:extLst>
+  </p:cSld>
+  <p:clrMapOvr>
+    <a:masterClrMapping/>
+  </p:clrMapOvr>
+</p:sld>
+</file>
+
+<file path=ppt/slides/slide4.xml><?xml version="1.0" encoding="utf-8"?>
+<p:sld xmlns:a="http://schemas.openxmlformats.org/drawingml/2006/main" xmlns:r="http://schemas.openxmlformats.org/officeDocument/2006/relationships" xmlns:p="http://schemas.openxmlformats.org/presentationml/2006/main">
+  <p:cSld>
+    <p:spTree>
+      <p:nvGrpSpPr>
+        <p:cNvPr id="1" name=""/>
+        <p:cNvGrpSpPr/>
+        <p:nvPr/>
+      </p:nvGrpSpPr>
+      <p:grpSpPr>
+        <a:xfrm>
+          <a:off x="0" y="0"/>
+          <a:ext cx="0" cy="0"/>
+          <a:chOff x="0" y="0"/>
+          <a:chExt cx="0" cy="0"/>
+        </a:xfrm>
+      </p:grpSpPr>
+      <p:pic>
+        <p:nvPicPr>
+          <p:cNvPr id="5" name="그림 4"/>
+          <p:cNvPicPr>
+            <a:picLocks noChangeAspect="1"/>
+          </p:cNvPicPr>
+          <p:nvPr/>
+        </p:nvPicPr>
+        <p:blipFill>
+          <a:blip r:embed="rId2" cstate="print">
+            <a:extLst>
+              <a:ext uri="{BEBA8EAE-BF5A-486C-A8C5-ECC9F3942E4B}">
+                <a14:imgProps xmlns:a14="http://schemas.microsoft.com/office/drawing/2010/main">
+                  <a14:imgLayer r:embed="rId3">
+                    <a14:imgEffect>
+                      <a14:backgroundRemoval t="0" b="100000" l="0" r="100000">
+                        <a14:foregroundMark x1="64912" y1="18100" x2="38158" y2="16742"/>
+                        <a14:foregroundMark x1="58772" y1="24887" x2="45175" y2="25792"/>
+                        <a14:foregroundMark x1="60965" y1="32127" x2="43860" y2="33484"/>
+                        <a14:foregroundMark x1="60088" y1="36199" x2="47807" y2="38009"/>
+                        <a14:foregroundMark x1="64912" y1="40271" x2="65789" y2="43891"/>
+                        <a14:foregroundMark x1="39035" y1="40724" x2="37719" y2="43439"/>
+                        <a14:foregroundMark x1="67105" y1="50679" x2="64474" y2="56109"/>
+                        <a14:foregroundMark x1="53070" y1="57014" x2="25439" y2="68778"/>
+                        <a14:foregroundMark x1="43860" y1="70588" x2="33333" y2="67873"/>
+                      </a14:backgroundRemoval>
+                    </a14:imgEffect>
+                  </a14:imgLayer>
+                </a14:imgProps>
+              </a:ext>
+              <a:ext uri="{28A0092B-C50C-407E-A947-70E740481C1C}">
+                <a14:useLocalDpi xmlns:a14="http://schemas.microsoft.com/office/drawing/2010/main" val="0"/>
+              </a:ext>
+            </a:extLst>
+          </a:blip>
+          <a:stretch>
+            <a:fillRect/>
+          </a:stretch>
+        </p:blipFill>
+        <p:spPr>
+          <a:xfrm>
+            <a:off x="4829197" y="1007818"/>
+            <a:ext cx="2160000" cy="2108749"/>
+          </a:xfrm>
+          <a:prstGeom prst="rect">
+            <a:avLst/>
+          </a:prstGeom>
+        </p:spPr>
+      </p:pic>
       <p:grpSp>
         <p:nvGrpSpPr>
-          <p:cNvPr id="3" name="그룹 2"/>
+          <p:cNvPr id="7" name="그룹 6"/>
           <p:cNvGrpSpPr/>
           <p:nvPr/>
         </p:nvGrpSpPr>
         <p:grpSpPr>
           <a:xfrm>
-            <a:off x="4469732" y="2658981"/>
-            <a:ext cx="2943592" cy="806114"/>
-            <a:chOff x="4420019" y="2213812"/>
-            <a:chExt cx="3628536" cy="986588"/>
+            <a:off x="4895372" y="3622151"/>
+            <a:ext cx="2159998" cy="2160000"/>
+            <a:chOff x="5065292" y="2094140"/>
+            <a:chExt cx="2117887" cy="1175690"/>
           </a:xfrm>
         </p:grpSpPr>
-        <p:pic>
-          <p:nvPicPr>
-            <p:cNvPr id="5" name="그림 4"/>
-            <p:cNvPicPr>
-              <a:picLocks noChangeAspect="1"/>
-            </p:cNvPicPr>
+        <p:sp>
+          <p:nvSpPr>
+            <p:cNvPr id="4" name="TextBox 3"/>
+            <p:cNvSpPr txBox="1"/>
             <p:nvPr/>
-          </p:nvPicPr>
-          <p:blipFill>
-            <a:blip r:embed="rId2" cstate="print">
-              <a:extLst>
-                <a:ext uri="{BEBA8EAE-BF5A-486C-A8C5-ECC9F3942E4B}">
-                  <a14:imgProps xmlns:a14="http://schemas.microsoft.com/office/drawing/2010/main">
-                    <a14:imgLayer r:embed="rId3">
-                      <a14:imgEffect>
-                        <a14:backgroundRemoval t="0" b="100000" l="0" r="100000">
-                          <a14:foregroundMark x1="64912" y1="18100" x2="38158" y2="16742"/>
-                          <a14:foregroundMark x1="58772" y1="24887" x2="45175" y2="25792"/>
-                          <a14:foregroundMark x1="60965" y1="32127" x2="43860" y2="33484"/>
-                          <a14:foregroundMark x1="60088" y1="36199" x2="47807" y2="38009"/>
-                          <a14:foregroundMark x1="64912" y1="40271" x2="65789" y2="43891"/>
-                          <a14:foregroundMark x1="39035" y1="40724" x2="37719" y2="43439"/>
-                          <a14:foregroundMark x1="67105" y1="50679" x2="64474" y2="56109"/>
-                          <a14:foregroundMark x1="53070" y1="57014" x2="25439" y2="68778"/>
-                          <a14:foregroundMark x1="43860" y1="70588" x2="33333" y2="67873"/>
-                        </a14:backgroundRemoval>
-                      </a14:imgEffect>
-                    </a14:imgLayer>
-                  </a14:imgProps>
-                </a:ext>
-                <a:ext uri="{28A0092B-C50C-407E-A947-70E740481C1C}">
-                  <a14:useLocalDpi xmlns:a14="http://schemas.microsoft.com/office/drawing/2010/main" val="0"/>
-                </a:ext>
-              </a:extLst>
-            </a:blip>
-            <a:stretch>
-              <a:fillRect/>
-            </a:stretch>
-          </p:blipFill>
+          </p:nvSpPr>
           <p:spPr>
             <a:xfrm>
-              <a:off x="4420019" y="2213812"/>
-              <a:ext cx="1017838" cy="986588"/>
+              <a:off x="5065292" y="2531166"/>
+              <a:ext cx="1778051" cy="738664"/>
             </a:xfrm>
             <a:prstGeom prst="rect">
               <a:avLst/>
             </a:prstGeom>
+            <a:noFill/>
           </p:spPr>
-        </p:pic>
+          <p:txBody>
+            <a:bodyPr wrap="none" rtlCol="0">
+              <a:spAutoFit/>
+            </a:bodyPr>
+            <a:lstStyle/>
+            <a:p>
+              <a:r>
+                <a:rPr lang="ko-KR" altLang="en-US" sz="1400" dirty="0" smtClean="0">
+                  <a:latin typeface="나눔스퀘어 ExtraBold" panose="020B0600000101010101" pitchFamily="50" charset="-127"/>
+                  <a:ea typeface="나눔스퀘어 ExtraBold" panose="020B0600000101010101" pitchFamily="50" charset="-127"/>
+                </a:rPr>
+                <a:t>컴퓨터과학부</a:t>
+              </a:r>
+              <a:endParaRPr lang="en-US" altLang="ko-KR" sz="1400" dirty="0" smtClean="0">
+                <a:latin typeface="나눔스퀘어 ExtraBold" panose="020B0600000101010101" pitchFamily="50" charset="-127"/>
+                <a:ea typeface="나눔스퀘어 ExtraBold" panose="020B0600000101010101" pitchFamily="50" charset="-127"/>
+              </a:endParaRPr>
+            </a:p>
+            <a:p>
+              <a:r>
+                <a:rPr lang="en-US" altLang="ko-KR" sz="1400" dirty="0" smtClean="0">
+                  <a:latin typeface="나눔스퀘어 Light" panose="020B0600000101010101" pitchFamily="50" charset="-127"/>
+                  <a:ea typeface="나눔스퀘어 Light" panose="020B0600000101010101" pitchFamily="50" charset="-127"/>
+                </a:rPr>
+                <a:t>2015920016 </a:t>
+              </a:r>
+              <a:r>
+                <a:rPr lang="ko-KR" altLang="en-US" sz="1400" dirty="0" err="1" smtClean="0">
+                  <a:latin typeface="나눔스퀘어 Light" panose="020B0600000101010101" pitchFamily="50" charset="-127"/>
+                  <a:ea typeface="나눔스퀘어 Light" panose="020B0600000101010101" pitchFamily="50" charset="-127"/>
+                </a:rPr>
+                <a:t>도우찬</a:t>
+              </a:r>
+              <a:endParaRPr lang="en-US" altLang="ko-KR" sz="1400" dirty="0" smtClean="0">
+                <a:latin typeface="나눔스퀘어 Light" panose="020B0600000101010101" pitchFamily="50" charset="-127"/>
+                <a:ea typeface="나눔스퀘어 Light" panose="020B0600000101010101" pitchFamily="50" charset="-127"/>
+              </a:endParaRPr>
+            </a:p>
+            <a:p>
+              <a:r>
+                <a:rPr lang="en-US" altLang="ko-KR" sz="1400" dirty="0" smtClean="0">
+                  <a:latin typeface="나눔스퀘어 Light" panose="020B0600000101010101" pitchFamily="50" charset="-127"/>
+                  <a:ea typeface="나눔스퀘어 Light" panose="020B0600000101010101" pitchFamily="50" charset="-127"/>
+                </a:rPr>
+                <a:t>2015920057 </a:t>
+              </a:r>
+              <a:r>
+                <a:rPr lang="ko-KR" altLang="en-US" sz="1400" dirty="0" err="1" smtClean="0">
+                  <a:latin typeface="나눔스퀘어 Light" panose="020B0600000101010101" pitchFamily="50" charset="-127"/>
+                  <a:ea typeface="나눔스퀘어 Light" panose="020B0600000101010101" pitchFamily="50" charset="-127"/>
+                </a:rPr>
+                <a:t>하경민</a:t>
+              </a:r>
+              <a:endParaRPr lang="ko-KR" altLang="en-US" sz="1400" dirty="0">
+                <a:latin typeface="나눔스퀘어 Light" panose="020B0600000101010101" pitchFamily="50" charset="-127"/>
+                <a:ea typeface="나눔스퀘어 Light" panose="020B0600000101010101" pitchFamily="50" charset="-127"/>
+              </a:endParaRPr>
+            </a:p>
+          </p:txBody>
+        </p:sp>
         <p:sp>
           <p:nvSpPr>
             <p:cNvPr id="6" name="TextBox 5"/>
@@ -3855,8 +3857,8 @@
           </p:nvSpPr>
           <p:spPr>
             <a:xfrm>
-              <a:off x="5437857" y="2383940"/>
-              <a:ext cx="2610698" cy="640359"/>
+              <a:off x="5065292" y="2094140"/>
+              <a:ext cx="2117887" cy="523220"/>
             </a:xfrm>
             <a:prstGeom prst="rect">
               <a:avLst/>

</xml_diff>

<commit_message>
modify robotimg, and new mpaguiform.java
</commit_message>
<xml_diff>
--- a/mapimgs/simimgs.pptx
+++ b/mapimgs/simimgs.pptx
@@ -3417,14 +3417,220 @@
       </p:sp>
       <p:pic>
         <p:nvPicPr>
-          <p:cNvPr id="18" name="그림 17"/>
+          <p:cNvPr id="13" name="그림 12"/>
           <p:cNvPicPr>
             <a:picLocks/>
           </p:cNvPicPr>
           <p:nvPr/>
         </p:nvPicPr>
         <p:blipFill rotWithShape="1">
-          <a:blip r:embed="rId9">
+          <a:blip r:embed="rId9" cstate="print">
+            <a:extLst>
+              <a:ext uri="{BEBA8EAE-BF5A-486C-A8C5-ECC9F3942E4B}">
+                <a14:imgProps xmlns:a14="http://schemas.microsoft.com/office/drawing/2010/main">
+                  <a14:imgLayer r:embed="rId10">
+                    <a14:imgEffect>
+                      <a14:backgroundRemoval t="5100" b="94400" l="5200" r="97200">
+                        <a14:foregroundMark x1="42133" y1="28100" x2="44667" y2="30700"/>
+                        <a14:foregroundMark x1="51067" y1="8900" x2="56533" y2="13400"/>
+                        <a14:foregroundMark x1="55067" y1="10800" x2="51733" y2="7800"/>
+                        <a14:foregroundMark x1="47067" y1="7800" x2="46800" y2="8400"/>
+                        <a14:foregroundMark x1="43733" y1="8600" x2="43867" y2="8200"/>
+                      </a14:backgroundRemoval>
+                    </a14:imgEffect>
+                  </a14:imgLayer>
+                </a14:imgProps>
+              </a:ext>
+              <a:ext uri="{28A0092B-C50C-407E-A947-70E740481C1C}">
+                <a14:useLocalDpi xmlns:a14="http://schemas.microsoft.com/office/drawing/2010/main" val="0"/>
+              </a:ext>
+            </a:extLst>
+          </a:blip>
+          <a:srcRect l="3082" t="6870" r="3217" b="10942"/>
+          <a:stretch/>
+        </p:blipFill>
+        <p:spPr>
+          <a:xfrm>
+            <a:off x="9535887" y="2988630"/>
+            <a:ext cx="1080000" cy="1080000"/>
+          </a:xfrm>
+          <a:prstGeom prst="rect">
+            <a:avLst/>
+          </a:prstGeom>
+        </p:spPr>
+      </p:pic>
+      <p:pic>
+        <p:nvPicPr>
+          <p:cNvPr id="14" name="그림 13"/>
+          <p:cNvPicPr>
+            <a:picLocks/>
+          </p:cNvPicPr>
+          <p:nvPr/>
+        </p:nvPicPr>
+        <p:blipFill rotWithShape="1">
+          <a:blip r:embed="rId9" cstate="print">
+            <a:extLst>
+              <a:ext uri="{BEBA8EAE-BF5A-486C-A8C5-ECC9F3942E4B}">
+                <a14:imgProps xmlns:a14="http://schemas.microsoft.com/office/drawing/2010/main">
+                  <a14:imgLayer r:embed="rId10">
+                    <a14:imgEffect>
+                      <a14:backgroundRemoval t="5100" b="94400" l="5200" r="97200">
+                        <a14:foregroundMark x1="42133" y1="28100" x2="44667" y2="30700"/>
+                        <a14:foregroundMark x1="51067" y1="8900" x2="56533" y2="13400"/>
+                        <a14:foregroundMark x1="55067" y1="10800" x2="51733" y2="7800"/>
+                        <a14:foregroundMark x1="47067" y1="7800" x2="46800" y2="8400"/>
+                        <a14:foregroundMark x1="43733" y1="8600" x2="43867" y2="8200"/>
+                      </a14:backgroundRemoval>
+                    </a14:imgEffect>
+                  </a14:imgLayer>
+                </a14:imgProps>
+              </a:ext>
+              <a:ext uri="{28A0092B-C50C-407E-A947-70E740481C1C}">
+                <a14:useLocalDpi xmlns:a14="http://schemas.microsoft.com/office/drawing/2010/main" val="0"/>
+              </a:ext>
+            </a:extLst>
+          </a:blip>
+          <a:srcRect l="3082" t="6870" r="3217" b="10942"/>
+          <a:stretch/>
+        </p:blipFill>
+        <p:spPr>
+          <a:xfrm rot="5400000">
+            <a:off x="8233520" y="4352973"/>
+            <a:ext cx="1080000" cy="1080000"/>
+          </a:xfrm>
+          <a:prstGeom prst="rect">
+            <a:avLst/>
+          </a:prstGeom>
+        </p:spPr>
+      </p:pic>
+      <p:pic>
+        <p:nvPicPr>
+          <p:cNvPr id="15" name="그림 14"/>
+          <p:cNvPicPr>
+            <a:picLocks/>
+          </p:cNvPicPr>
+          <p:nvPr/>
+        </p:nvPicPr>
+        <p:blipFill rotWithShape="1">
+          <a:blip r:embed="rId9" cstate="print">
+            <a:extLst>
+              <a:ext uri="{BEBA8EAE-BF5A-486C-A8C5-ECC9F3942E4B}">
+                <a14:imgProps xmlns:a14="http://schemas.microsoft.com/office/drawing/2010/main">
+                  <a14:imgLayer r:embed="rId10">
+                    <a14:imgEffect>
+                      <a14:backgroundRemoval t="5100" b="94400" l="5200" r="97200">
+                        <a14:foregroundMark x1="42133" y1="28100" x2="44667" y2="30700"/>
+                        <a14:foregroundMark x1="51067" y1="8900" x2="56533" y2="13400"/>
+                        <a14:foregroundMark x1="55067" y1="10800" x2="51733" y2="7800"/>
+                        <a14:foregroundMark x1="47067" y1="7800" x2="46800" y2="8400"/>
+                        <a14:foregroundMark x1="43733" y1="8600" x2="43867" y2="8200"/>
+                      </a14:backgroundRemoval>
+                    </a14:imgEffect>
+                  </a14:imgLayer>
+                </a14:imgProps>
+              </a:ext>
+              <a:ext uri="{28A0092B-C50C-407E-A947-70E740481C1C}">
+                <a14:useLocalDpi xmlns:a14="http://schemas.microsoft.com/office/drawing/2010/main" val="0"/>
+              </a:ext>
+            </a:extLst>
+          </a:blip>
+          <a:srcRect l="3082" t="6870" r="3217" b="10942"/>
+          <a:stretch/>
+        </p:blipFill>
+        <p:spPr>
+          <a:xfrm rot="10800000">
+            <a:off x="6908441" y="3016876"/>
+            <a:ext cx="1080000" cy="1080000"/>
+          </a:xfrm>
+          <a:prstGeom prst="rect">
+            <a:avLst/>
+          </a:prstGeom>
+        </p:spPr>
+      </p:pic>
+      <p:pic>
+        <p:nvPicPr>
+          <p:cNvPr id="17" name="그림 16"/>
+          <p:cNvPicPr>
+            <a:picLocks/>
+          </p:cNvPicPr>
+          <p:nvPr/>
+        </p:nvPicPr>
+        <p:blipFill rotWithShape="1">
+          <a:blip r:embed="rId9" cstate="print">
+            <a:extLst>
+              <a:ext uri="{BEBA8EAE-BF5A-486C-A8C5-ECC9F3942E4B}">
+                <a14:imgProps xmlns:a14="http://schemas.microsoft.com/office/drawing/2010/main">
+                  <a14:imgLayer r:embed="rId10">
+                    <a14:imgEffect>
+                      <a14:backgroundRemoval t="5100" b="94400" l="5200" r="97200">
+                        <a14:foregroundMark x1="42133" y1="28100" x2="44667" y2="30700"/>
+                        <a14:foregroundMark x1="51067" y1="8900" x2="56533" y2="13400"/>
+                        <a14:foregroundMark x1="55067" y1="10800" x2="51733" y2="7800"/>
+                        <a14:foregroundMark x1="47067" y1="7800" x2="46800" y2="8400"/>
+                        <a14:foregroundMark x1="43733" y1="8600" x2="43867" y2="8200"/>
+                      </a14:backgroundRemoval>
+                    </a14:imgEffect>
+                  </a14:imgLayer>
+                </a14:imgProps>
+              </a:ext>
+              <a:ext uri="{28A0092B-C50C-407E-A947-70E740481C1C}">
+                <a14:useLocalDpi xmlns:a14="http://schemas.microsoft.com/office/drawing/2010/main" val="0"/>
+              </a:ext>
+            </a:extLst>
+          </a:blip>
+          <a:srcRect l="3082" t="6870" r="3217" b="10942"/>
+          <a:stretch/>
+        </p:blipFill>
+        <p:spPr>
+          <a:xfrm rot="16200000">
+            <a:off x="8149413" y="1936876"/>
+            <a:ext cx="1080000" cy="1080000"/>
+          </a:xfrm>
+          <a:prstGeom prst="rect">
+            <a:avLst/>
+          </a:prstGeom>
+        </p:spPr>
+      </p:pic>
+    </p:spTree>
+    <p:extLst>
+      <p:ext uri="{BB962C8B-B14F-4D97-AF65-F5344CB8AC3E}">
+        <p14:creationId xmlns:p14="http://schemas.microsoft.com/office/powerpoint/2010/main" val="2408873444"/>
+      </p:ext>
+    </p:extLst>
+  </p:cSld>
+  <p:clrMapOvr>
+    <a:masterClrMapping/>
+  </p:clrMapOvr>
+</p:sld>
+</file>
+
+<file path=ppt/slides/slide3.xml><?xml version="1.0" encoding="utf-8"?>
+<p:sld xmlns:a="http://schemas.openxmlformats.org/drawingml/2006/main" xmlns:r="http://schemas.openxmlformats.org/officeDocument/2006/relationships" xmlns:p="http://schemas.openxmlformats.org/presentationml/2006/main">
+  <p:cSld>
+    <p:spTree>
+      <p:nvGrpSpPr>
+        <p:cNvPr id="1" name=""/>
+        <p:cNvGrpSpPr/>
+        <p:nvPr/>
+      </p:nvGrpSpPr>
+      <p:grpSpPr>
+        <a:xfrm>
+          <a:off x="0" y="0"/>
+          <a:ext cx="0" cy="0"/>
+          <a:chOff x="0" y="0"/>
+          <a:chExt cx="0" cy="0"/>
+        </a:xfrm>
+      </p:grpSpPr>
+      <p:pic>
+        <p:nvPicPr>
+          <p:cNvPr id="4" name="그림 3"/>
+          <p:cNvPicPr>
+            <a:picLocks/>
+          </p:cNvPicPr>
+          <p:nvPr/>
+        </p:nvPicPr>
+        <p:blipFill rotWithShape="1">
+          <a:blip r:embed="rId2">
             <a:extLst>
               <a:ext uri="{BEBA8EAE-BF5A-486C-A8C5-ECC9F3942E4B}">
                 <a14:imgProps xmlns:a14="http://schemas.microsoft.com/office/drawing/2010/main">
@@ -3464,14 +3670,14 @@
       </p:pic>
       <p:pic>
         <p:nvPicPr>
-          <p:cNvPr id="19" name="그림 18"/>
+          <p:cNvPr id="6" name="그림 5"/>
           <p:cNvPicPr>
             <a:picLocks/>
           </p:cNvPicPr>
           <p:nvPr/>
         </p:nvPicPr>
         <p:blipFill rotWithShape="1">
-          <a:blip r:embed="rId9">
+          <a:blip r:embed="rId2">
             <a:extLst>
               <a:ext uri="{BEBA8EAE-BF5A-486C-A8C5-ECC9F3942E4B}">
                 <a14:imgProps xmlns:a14="http://schemas.microsoft.com/office/drawing/2010/main">
@@ -3511,14 +3717,14 @@
       </p:pic>
       <p:pic>
         <p:nvPicPr>
-          <p:cNvPr id="20" name="그림 19"/>
+          <p:cNvPr id="7" name="그림 6"/>
           <p:cNvPicPr>
             <a:picLocks/>
           </p:cNvPicPr>
           <p:nvPr/>
         </p:nvPicPr>
         <p:blipFill rotWithShape="1">
-          <a:blip r:embed="rId9">
+          <a:blip r:embed="rId2">
             <a:extLst>
               <a:ext uri="{BEBA8EAE-BF5A-486C-A8C5-ECC9F3942E4B}">
                 <a14:imgProps xmlns:a14="http://schemas.microsoft.com/office/drawing/2010/main">
@@ -3558,84 +3764,7 @@
       </p:pic>
       <p:pic>
         <p:nvPicPr>
-          <p:cNvPr id="21" name="그림 20"/>
-          <p:cNvPicPr>
-            <a:picLocks/>
-          </p:cNvPicPr>
-          <p:nvPr/>
-        </p:nvPicPr>
-        <p:blipFill rotWithShape="1">
-          <a:blip r:embed="rId9">
-            <a:extLst>
-              <a:ext uri="{BEBA8EAE-BF5A-486C-A8C5-ECC9F3942E4B}">
-                <a14:imgProps xmlns:a14="http://schemas.microsoft.com/office/drawing/2010/main">
-                  <a14:imgLayer r:embed="rId3">
-                    <a14:imgEffect>
-                      <a14:backgroundRemoval t="51042" b="73125" l="34375" r="50469">
-                        <a14:foregroundMark x1="38125" y1="54792" x2="39375" y2="55208"/>
-                        <a14:foregroundMark x1="44063" y1="52083" x2="45156" y2="53542"/>
-                        <a14:foregroundMark x1="42344" y1="61042" x2="41406" y2="62292"/>
-                        <a14:foregroundMark x1="37031" y1="64375" x2="35938" y2="66042"/>
-                        <a14:foregroundMark x1="39531" y1="54792" x2="38750" y2="54583"/>
-                        <a14:foregroundMark x1="39375" y1="55833" x2="39375" y2="56458"/>
-                        <a14:foregroundMark x1="45000" y1="52917" x2="45000" y2="52500"/>
-                        <a14:backgroundMark x1="43281" y1="61250" x2="42969" y2="62292"/>
-                      </a14:backgroundRemoval>
-                    </a14:imgEffect>
-                  </a14:imgLayer>
-                </a14:imgProps>
-              </a:ext>
-              <a:ext uri="{28A0092B-C50C-407E-A947-70E740481C1C}">
-                <a14:useLocalDpi xmlns:a14="http://schemas.microsoft.com/office/drawing/2010/main" val="0"/>
-              </a:ext>
-            </a:extLst>
-          </a:blip>
-          <a:srcRect l="34644" t="51131" r="50535" b="27560"/>
-          <a:stretch/>
-        </p:blipFill>
-        <p:spPr>
-          <a:xfrm rot="5400000">
-            <a:off x="9013372" y="4086303"/>
-            <a:ext cx="1080000" cy="1080000"/>
-          </a:xfrm>
-          <a:prstGeom prst="rect">
-            <a:avLst/>
-          </a:prstGeom>
-        </p:spPr>
-      </p:pic>
-    </p:spTree>
-    <p:extLst>
-      <p:ext uri="{BB962C8B-B14F-4D97-AF65-F5344CB8AC3E}">
-        <p14:creationId xmlns:p14="http://schemas.microsoft.com/office/powerpoint/2010/main" val="2408873444"/>
-      </p:ext>
-    </p:extLst>
-  </p:cSld>
-  <p:clrMapOvr>
-    <a:masterClrMapping/>
-  </p:clrMapOvr>
-</p:sld>
-</file>
-
-<file path=ppt/slides/slide3.xml><?xml version="1.0" encoding="utf-8"?>
-<p:sld xmlns:a="http://schemas.openxmlformats.org/drawingml/2006/main" xmlns:r="http://schemas.openxmlformats.org/officeDocument/2006/relationships" xmlns:p="http://schemas.openxmlformats.org/presentationml/2006/main">
-  <p:cSld>
-    <p:spTree>
-      <p:nvGrpSpPr>
-        <p:cNvPr id="1" name=""/>
-        <p:cNvGrpSpPr/>
-        <p:nvPr/>
-      </p:nvGrpSpPr>
-      <p:grpSpPr>
-        <a:xfrm>
-          <a:off x="0" y="0"/>
-          <a:ext cx="0" cy="0"/>
-          <a:chOff x="0" y="0"/>
-          <a:chExt cx="0" cy="0"/>
-        </a:xfrm>
-      </p:grpSpPr>
-      <p:pic>
-        <p:nvPicPr>
-          <p:cNvPr id="5" name="그림 4"/>
+          <p:cNvPr id="8" name="그림 7"/>
           <p:cNvPicPr>
             <a:picLocks/>
           </p:cNvPicPr>
@@ -3671,8 +3800,8 @@
           <a:stretch/>
         </p:blipFill>
         <p:spPr>
-          <a:xfrm>
-            <a:off x="1553029" y="551541"/>
+          <a:xfrm rot="5400000">
+            <a:off x="9013372" y="4086303"/>
             <a:ext cx="1080000" cy="1080000"/>
           </a:xfrm>
           <a:prstGeom prst="rect">

</xml_diff>

<commit_message>
add new guiform java, txt, imgs
</commit_message>
<xml_diff>
--- a/mapimgs/simimgs.pptx
+++ b/mapimgs/simimgs.pptx
@@ -8,7 +8,8 @@
     <p:sldId id="268" r:id="rId2"/>
     <p:sldId id="272" r:id="rId3"/>
     <p:sldId id="273" r:id="rId4"/>
-    <p:sldId id="267" r:id="rId5"/>
+    <p:sldId id="274" r:id="rId5"/>
+    <p:sldId id="267" r:id="rId6"/>
   </p:sldIdLst>
   <p:sldSz cx="12192000" cy="6858000"/>
   <p:notesSz cx="6858000" cy="9144000"/>
@@ -3823,6 +3824,287 @@
 </file>
 
 <file path=ppt/slides/slide4.xml><?xml version="1.0" encoding="utf-8"?>
+<p:sld xmlns:a="http://schemas.openxmlformats.org/drawingml/2006/main" xmlns:r="http://schemas.openxmlformats.org/officeDocument/2006/relationships" xmlns:p="http://schemas.openxmlformats.org/presentationml/2006/main">
+  <p:cSld>
+    <p:spTree>
+      <p:nvGrpSpPr>
+        <p:cNvPr id="1" name=""/>
+        <p:cNvGrpSpPr/>
+        <p:nvPr/>
+      </p:nvGrpSpPr>
+      <p:grpSpPr>
+        <a:xfrm>
+          <a:off x="0" y="0"/>
+          <a:ext cx="0" cy="0"/>
+          <a:chOff x="0" y="0"/>
+          <a:chExt cx="0" cy="0"/>
+        </a:xfrm>
+      </p:grpSpPr>
+      <p:pic>
+        <p:nvPicPr>
+          <p:cNvPr id="4" name="그림 3"/>
+          <p:cNvPicPr>
+            <a:picLocks/>
+          </p:cNvPicPr>
+          <p:nvPr/>
+        </p:nvPicPr>
+        <p:blipFill>
+          <a:blip r:embed="rId2">
+            <a:extLst>
+              <a:ext uri="{BEBA8EAE-BF5A-486C-A8C5-ECC9F3942E4B}">
+                <a14:imgProps xmlns:a14="http://schemas.microsoft.com/office/drawing/2010/main">
+                  <a14:imgLayer r:embed="rId3">
+                    <a14:imgEffect>
+                      <a14:backgroundRemoval t="391" b="100000" l="391" r="100000">
+                        <a14:foregroundMark x1="53125" y1="28125" x2="58203" y2="41406"/>
+                      </a14:backgroundRemoval>
+                    </a14:imgEffect>
+                  </a14:imgLayer>
+                </a14:imgProps>
+              </a:ext>
+              <a:ext uri="{28A0092B-C50C-407E-A947-70E740481C1C}">
+                <a14:useLocalDpi xmlns:a14="http://schemas.microsoft.com/office/drawing/2010/main" val="0"/>
+              </a:ext>
+            </a:extLst>
+          </a:blip>
+          <a:stretch>
+            <a:fillRect/>
+          </a:stretch>
+        </p:blipFill>
+        <p:spPr>
+          <a:xfrm>
+            <a:off x="3993529" y="1752216"/>
+            <a:ext cx="1080000" cy="1080000"/>
+          </a:xfrm>
+          <a:prstGeom prst="rect">
+            <a:avLst/>
+          </a:prstGeom>
+        </p:spPr>
+      </p:pic>
+      <p:pic>
+        <p:nvPicPr>
+          <p:cNvPr id="8" name="그림 7"/>
+          <p:cNvPicPr>
+            <a:picLocks/>
+          </p:cNvPicPr>
+          <p:nvPr/>
+        </p:nvPicPr>
+        <p:blipFill rotWithShape="1">
+          <a:blip r:embed="rId4" cstate="print">
+            <a:extLst>
+              <a:ext uri="{BEBA8EAE-BF5A-486C-A8C5-ECC9F3942E4B}">
+                <a14:imgProps xmlns:a14="http://schemas.microsoft.com/office/drawing/2010/main">
+                  <a14:imgLayer r:embed="rId5">
+                    <a14:imgEffect>
+                      <a14:backgroundRemoval t="532" b="100000" l="13800" r="88400">
+                        <a14:foregroundMark x1="36200" y1="47872" x2="32800" y2="45479"/>
+                        <a14:foregroundMark x1="34400" y1="42287" x2="31600" y2="42287"/>
+                        <a14:backgroundMark x1="50400" y1="52128" x2="50600" y2="50266"/>
+                      </a14:backgroundRemoval>
+                    </a14:imgEffect>
+                  </a14:imgLayer>
+                </a14:imgProps>
+              </a:ext>
+              <a:ext uri="{28A0092B-C50C-407E-A947-70E740481C1C}">
+                <a14:useLocalDpi xmlns:a14="http://schemas.microsoft.com/office/drawing/2010/main" val="0"/>
+              </a:ext>
+            </a:extLst>
+          </a:blip>
+          <a:srcRect l="12436" r="12175"/>
+          <a:stretch/>
+        </p:blipFill>
+        <p:spPr>
+          <a:xfrm>
+            <a:off x="7335348" y="2057017"/>
+            <a:ext cx="1080000" cy="1080000"/>
+          </a:xfrm>
+          <a:prstGeom prst="rect">
+            <a:avLst/>
+          </a:prstGeom>
+        </p:spPr>
+      </p:pic>
+      <p:pic>
+        <p:nvPicPr>
+          <p:cNvPr id="9" name="그림 8"/>
+          <p:cNvPicPr>
+            <a:picLocks/>
+          </p:cNvPicPr>
+          <p:nvPr/>
+        </p:nvPicPr>
+        <p:blipFill>
+          <a:blip r:embed="rId2">
+            <a:duotone>
+              <a:schemeClr val="bg2">
+                <a:shade val="45000"/>
+                <a:satMod val="135000"/>
+              </a:schemeClr>
+              <a:prstClr val="white"/>
+            </a:duotone>
+            <a:extLst>
+              <a:ext uri="{BEBA8EAE-BF5A-486C-A8C5-ECC9F3942E4B}">
+                <a14:imgProps xmlns:a14="http://schemas.microsoft.com/office/drawing/2010/main">
+                  <a14:imgLayer r:embed="rId3">
+                    <a14:imgEffect>
+                      <a14:backgroundRemoval t="391" b="100000" l="391" r="100000">
+                        <a14:foregroundMark x1="53125" y1="28125" x2="58203" y2="41406"/>
+                      </a14:backgroundRemoval>
+                    </a14:imgEffect>
+                  </a14:imgLayer>
+                </a14:imgProps>
+              </a:ext>
+              <a:ext uri="{28A0092B-C50C-407E-A947-70E740481C1C}">
+                <a14:useLocalDpi xmlns:a14="http://schemas.microsoft.com/office/drawing/2010/main" val="0"/>
+              </a:ext>
+            </a:extLst>
+          </a:blip>
+          <a:stretch>
+            <a:fillRect/>
+          </a:stretch>
+        </p:blipFill>
+        <p:spPr>
+          <a:xfrm>
+            <a:off x="3862901" y="3312809"/>
+            <a:ext cx="1080000" cy="1080000"/>
+          </a:xfrm>
+          <a:prstGeom prst="rect">
+            <a:avLst/>
+          </a:prstGeom>
+        </p:spPr>
+      </p:pic>
+      <p:sp>
+        <p:nvSpPr>
+          <p:cNvPr id="10" name="TextBox 9"/>
+          <p:cNvSpPr txBox="1"/>
+          <p:nvPr/>
+        </p:nvSpPr>
+        <p:spPr>
+          <a:xfrm>
+            <a:off x="1509486" y="4796971"/>
+            <a:ext cx="1776384" cy="369332"/>
+          </a:xfrm>
+          <a:prstGeom prst="rect">
+            <a:avLst/>
+          </a:prstGeom>
+          <a:noFill/>
+        </p:spPr>
+        <p:txBody>
+          <a:bodyPr wrap="none" rtlCol="0">
+            <a:spAutoFit/>
+          </a:bodyPr>
+          <a:lstStyle/>
+          <a:p>
+            <a:r>
+              <a:rPr lang="en-US" altLang="ko-KR" dirty="0" smtClean="0"/>
+              <a:t>FINISHEDGOAL</a:t>
+            </a:r>
+            <a:endParaRPr lang="ko-KR" altLang="en-US" dirty="0"/>
+          </a:p>
+        </p:txBody>
+      </p:sp>
+      <p:sp>
+        <p:nvSpPr>
+          <p:cNvPr id="11" name="TextBox 10"/>
+          <p:cNvSpPr txBox="1"/>
+          <p:nvPr/>
+        </p:nvSpPr>
+        <p:spPr>
+          <a:xfrm>
+            <a:off x="6088743" y="3312809"/>
+            <a:ext cx="1868588" cy="369332"/>
+          </a:xfrm>
+          <a:prstGeom prst="rect">
+            <a:avLst/>
+          </a:prstGeom>
+          <a:noFill/>
+        </p:spPr>
+        <p:txBody>
+          <a:bodyPr wrap="none" rtlCol="0">
+            <a:spAutoFit/>
+          </a:bodyPr>
+          <a:lstStyle/>
+          <a:p>
+            <a:r>
+              <a:rPr lang="en-US" altLang="ko-KR" dirty="0" smtClean="0"/>
+              <a:t>ROBOTONGOAL</a:t>
+            </a:r>
+            <a:endParaRPr lang="ko-KR" altLang="en-US" dirty="0"/>
+          </a:p>
+        </p:txBody>
+      </p:sp>
+      <p:sp>
+        <p:nvSpPr>
+          <p:cNvPr id="12" name="TextBox 11"/>
+          <p:cNvSpPr txBox="1"/>
+          <p:nvPr/>
+        </p:nvSpPr>
+        <p:spPr>
+          <a:xfrm>
+            <a:off x="2676290" y="1142588"/>
+            <a:ext cx="784125" cy="369332"/>
+          </a:xfrm>
+          <a:prstGeom prst="rect">
+            <a:avLst/>
+          </a:prstGeom>
+          <a:noFill/>
+        </p:spPr>
+        <p:txBody>
+          <a:bodyPr wrap="none" rtlCol="0">
+            <a:spAutoFit/>
+          </a:bodyPr>
+          <a:lstStyle/>
+          <a:p>
+            <a:r>
+              <a:rPr lang="en-US" altLang="ko-KR" dirty="0" smtClean="0"/>
+              <a:t>GOAL</a:t>
+            </a:r>
+            <a:endParaRPr lang="ko-KR" altLang="en-US" dirty="0"/>
+          </a:p>
+        </p:txBody>
+      </p:sp>
+      <p:sp>
+        <p:nvSpPr>
+          <p:cNvPr id="13" name="TextBox 12"/>
+          <p:cNvSpPr txBox="1"/>
+          <p:nvPr/>
+        </p:nvSpPr>
+        <p:spPr>
+          <a:xfrm>
+            <a:off x="4942901" y="4688736"/>
+            <a:ext cx="2738250" cy="369332"/>
+          </a:xfrm>
+          <a:prstGeom prst="rect">
+            <a:avLst/>
+          </a:prstGeom>
+          <a:noFill/>
+        </p:spPr>
+        <p:txBody>
+          <a:bodyPr wrap="none" rtlCol="0">
+            <a:spAutoFit/>
+          </a:bodyPr>
+          <a:lstStyle/>
+          <a:p>
+            <a:r>
+              <a:rPr lang="ko-KR" altLang="en-US" dirty="0" smtClean="0"/>
+              <a:t>다시 지나갈 확률이 있다</a:t>
+            </a:r>
+            <a:endParaRPr lang="ko-KR" altLang="en-US" dirty="0"/>
+          </a:p>
+        </p:txBody>
+      </p:sp>
+    </p:spTree>
+    <p:extLst>
+      <p:ext uri="{BB962C8B-B14F-4D97-AF65-F5344CB8AC3E}">
+        <p14:creationId xmlns:p14="http://schemas.microsoft.com/office/powerpoint/2010/main" val="1127249018"/>
+      </p:ext>
+    </p:extLst>
+  </p:cSld>
+  <p:clrMapOvr>
+    <a:masterClrMapping/>
+  </p:clrMapOvr>
+</p:sld>
+</file>
+
+<file path=ppt/slides/slide5.xml><?xml version="1.0" encoding="utf-8"?>
 <p:sld xmlns:a="http://schemas.openxmlformats.org/drawingml/2006/main" xmlns:r="http://schemas.openxmlformats.org/officeDocument/2006/relationships" xmlns:p="http://schemas.openxmlformats.org/presentationml/2006/main">
   <p:cSld>
     <p:spTree>

</xml_diff>